<commit_message>
Finished integrating Alisdair's comments into relocation presentation
</commit_message>
<xml_diff>
--- a/relocate/Trivial Relocation - St. Louis 06-2024.pptx
+++ b/relocate/Trivial Relocation - St. Louis 06-2024.pptx
@@ -242,7 +242,7 @@
           <a:p>
             <a:fld id="{CEFB5EEE-3E28-483D-83CF-7CFBAD280CA5}" type="datetimeFigureOut">
               <a:rPr lang="en-US" smtClean="0"/>
-              <a:t>6/19/2024</a:t>
+              <a:t>6/25/2024</a:t>
             </a:fld>
             <a:endParaRPr lang="en-US"/>
           </a:p>
@@ -507,6 +507,90 @@
     </a:lvl9pPr>
   </p:notesStyle>
 </p:notesMaster>
+</file>
+
+<file path=ppt/notesSlides/notesSlide1.xml><?xml version="1.0" encoding="utf-8"?>
+<p:notes xmlns:a="http://schemas.openxmlformats.org/drawingml/2006/main" xmlns:r="http://schemas.openxmlformats.org/officeDocument/2006/relationships" xmlns:p="http://schemas.openxmlformats.org/presentationml/2006/main">
+  <p:cSld>
+    <p:spTree>
+      <p:nvGrpSpPr>
+        <p:cNvPr id="1" name=""/>
+        <p:cNvGrpSpPr/>
+        <p:nvPr/>
+      </p:nvGrpSpPr>
+      <p:grpSpPr>
+        <a:xfrm>
+          <a:off x="0" y="0"/>
+          <a:ext cx="0" cy="0"/>
+          <a:chOff x="0" y="0"/>
+          <a:chExt cx="0" cy="0"/>
+        </a:xfrm>
+      </p:grpSpPr>
+      <p:sp>
+        <p:nvSpPr>
+          <p:cNvPr id="2" name="Slide Image Placeholder 1"/>
+          <p:cNvSpPr>
+            <a:spLocks noGrp="1" noRot="1" noChangeAspect="1"/>
+          </p:cNvSpPr>
+          <p:nvPr>
+            <p:ph type="sldImg"/>
+          </p:nvPr>
+        </p:nvSpPr>
+        <p:spPr/>
+      </p:sp>
+      <p:sp>
+        <p:nvSpPr>
+          <p:cNvPr id="3" name="Notes Placeholder 2"/>
+          <p:cNvSpPr>
+            <a:spLocks noGrp="1"/>
+          </p:cNvSpPr>
+          <p:nvPr>
+            <p:ph type="body" idx="1"/>
+          </p:nvPr>
+        </p:nvSpPr>
+        <p:spPr/>
+        <p:txBody>
+          <a:bodyPr/>
+          <a:lstStyle/>
+          <a:p>
+            <a:endParaRPr lang="en-US" dirty="0"/>
+          </a:p>
+        </p:txBody>
+      </p:sp>
+      <p:sp>
+        <p:nvSpPr>
+          <p:cNvPr id="4" name="Slide Number Placeholder 3"/>
+          <p:cNvSpPr>
+            <a:spLocks noGrp="1"/>
+          </p:cNvSpPr>
+          <p:nvPr>
+            <p:ph type="sldNum" sz="quarter" idx="5"/>
+          </p:nvPr>
+        </p:nvSpPr>
+        <p:spPr/>
+        <p:txBody>
+          <a:bodyPr/>
+          <a:lstStyle/>
+          <a:p>
+            <a:fld id="{D887240D-8D0E-46A5-956C-D9220330C76B}" type="slidenum">
+              <a:rPr lang="en-US" smtClean="0"/>
+              <a:t>39</a:t>
+            </a:fld>
+            <a:endParaRPr lang="en-US"/>
+          </a:p>
+        </p:txBody>
+      </p:sp>
+    </p:spTree>
+    <p:extLst>
+      <p:ext uri="{BB962C8B-B14F-4D97-AF65-F5344CB8AC3E}">
+        <p14:creationId xmlns:p14="http://schemas.microsoft.com/office/powerpoint/2010/main" val="3966459934"/>
+      </p:ext>
+    </p:extLst>
+  </p:cSld>
+  <p:clrMapOvr>
+    <a:masterClrMapping/>
+  </p:clrMapOvr>
+</p:notes>
 </file>
 
 <file path=ppt/slideLayouts/slideLayout1.xml><?xml version="1.0" encoding="utf-8"?>
@@ -1009,7 +1093,7 @@
           <a:p>
             <a:fld id="{02C5BE3E-DC87-4987-AF70-1F906EC5439D}" type="datetime1">
               <a:rPr lang="en-US" smtClean="0"/>
-              <a:t>6/19/2024</a:t>
+              <a:t>6/25/2024</a:t>
             </a:fld>
             <a:endParaRPr lang="en-US"/>
           </a:p>
@@ -1302,7 +1386,7 @@
           <a:p>
             <a:fld id="{23D892F7-AA30-4A4C-B959-E3F3A9EC8524}" type="datetime1">
               <a:rPr lang="en-US" smtClean="0"/>
-              <a:t>6/19/2024</a:t>
+              <a:t>6/25/2024</a:t>
             </a:fld>
             <a:endParaRPr lang="en-US"/>
           </a:p>
@@ -1548,7 +1632,7 @@
           <a:p>
             <a:fld id="{272C4D85-EDE8-4C6C-815F-2FEBAB7C380E}" type="datetime1">
               <a:rPr lang="en-US" smtClean="0"/>
-              <a:t>6/19/2024</a:t>
+              <a:t>6/25/2024</a:t>
             </a:fld>
             <a:endParaRPr lang="en-US"/>
           </a:p>
@@ -2086,7 +2170,7 @@
           <a:p>
             <a:fld id="{4F67D4DA-9BCF-452F-B904-BB8D0316B67C}" type="datetime1">
               <a:rPr lang="en-US" smtClean="0"/>
-              <a:t>6/19/2024</a:t>
+              <a:t>6/25/2024</a:t>
             </a:fld>
             <a:endParaRPr lang="en-US"/>
           </a:p>
@@ -2332,7 +2416,7 @@
           <a:p>
             <a:fld id="{E2226ABC-75D3-4A22-ADAE-704E445553F8}" type="datetime1">
               <a:rPr lang="en-US" smtClean="0"/>
-              <a:t>6/19/2024</a:t>
+              <a:t>6/25/2024</a:t>
             </a:fld>
             <a:endParaRPr lang="en-US"/>
           </a:p>
@@ -2862,7 +2946,7 @@
           <a:p>
             <a:fld id="{B3EB47DD-4F4F-4521-809A-910C6446A8E9}" type="datetime1">
               <a:rPr lang="en-US" smtClean="0"/>
-              <a:t>6/19/2024</a:t>
+              <a:t>6/25/2024</a:t>
             </a:fld>
             <a:endParaRPr lang="en-US"/>
           </a:p>
@@ -3157,7 +3241,7 @@
           <a:p>
             <a:fld id="{D5C1893C-E788-48A8-9A18-B793B108C2CE}" type="datetime1">
               <a:rPr lang="en-US" smtClean="0"/>
-              <a:t>6/19/2024</a:t>
+              <a:t>6/25/2024</a:t>
             </a:fld>
             <a:endParaRPr lang="en-US"/>
           </a:p>
@@ -3328,7 +3412,7 @@
           <a:p>
             <a:fld id="{89F61247-4C9D-47C0-9657-80C96CCB02A1}" type="datetime1">
               <a:rPr lang="en-US" smtClean="0"/>
-              <a:t>6/19/2024</a:t>
+              <a:t>6/25/2024</a:t>
             </a:fld>
             <a:endParaRPr lang="en-US"/>
           </a:p>
@@ -3505,7 +3589,7 @@
           <a:p>
             <a:fld id="{2BB2F593-965F-47F8-9F01-94BF3B3362FD}" type="datetime1">
               <a:rPr lang="en-US" smtClean="0"/>
-              <a:t>6/19/2024</a:t>
+              <a:t>6/25/2024</a:t>
             </a:fld>
             <a:endParaRPr lang="en-US"/>
           </a:p>
@@ -3687,7 +3771,7 @@
           <a:p>
             <a:fld id="{D1A98742-6638-43AC-A30F-B0F4E802E4B2}" type="datetime1">
               <a:rPr lang="en-US" smtClean="0"/>
-              <a:t>6/19/2024</a:t>
+              <a:t>6/25/2024</a:t>
             </a:fld>
             <a:endParaRPr lang="en-US"/>
           </a:p>
@@ -3941,7 +4025,7 @@
           <a:p>
             <a:fld id="{E04F68CC-AE29-43DC-8C36-74D991BDD660}" type="datetime1">
               <a:rPr lang="en-US" smtClean="0"/>
-              <a:t>6/19/2024</a:t>
+              <a:t>6/25/2024</a:t>
             </a:fld>
             <a:endParaRPr lang="en-US"/>
           </a:p>
@@ -4239,7 +4323,7 @@
           <a:p>
             <a:fld id="{06ABA9E8-E98F-4A61-AF76-7349863B9923}" type="datetime1">
               <a:rPr lang="en-US" smtClean="0"/>
-              <a:t>6/19/2024</a:t>
+              <a:t>6/25/2024</a:t>
             </a:fld>
             <a:endParaRPr lang="en-US"/>
           </a:p>
@@ -4697,7 +4781,7 @@
           <a:p>
             <a:fld id="{508BABE2-3DC8-4D39-B4AF-CCF82C82E0F0}" type="datetime1">
               <a:rPr lang="en-US" smtClean="0"/>
-              <a:t>6/19/2024</a:t>
+              <a:t>6/25/2024</a:t>
             </a:fld>
             <a:endParaRPr lang="en-US"/>
           </a:p>
@@ -4833,7 +4917,7 @@
           <a:p>
             <a:fld id="{64601F53-FE17-4660-BE69-DE27478D4CCC}" type="datetime1">
               <a:rPr lang="en-US" smtClean="0"/>
-              <a:t>6/19/2024</a:t>
+              <a:t>6/25/2024</a:t>
             </a:fld>
             <a:endParaRPr lang="en-US"/>
           </a:p>
@@ -4942,7 +5026,7 @@
           <a:p>
             <a:fld id="{DDF66756-33DB-4322-A7AB-33F3A7E33A2D}" type="datetime1">
               <a:rPr lang="en-US" smtClean="0"/>
-              <a:t>6/19/2024</a:t>
+              <a:t>6/25/2024</a:t>
             </a:fld>
             <a:endParaRPr lang="en-US"/>
           </a:p>
@@ -5232,7 +5316,7 @@
           <a:p>
             <a:fld id="{E9CE1D7A-DAAA-4183-B469-EDEECE92431D}" type="datetime1">
               <a:rPr lang="en-US" smtClean="0"/>
-              <a:t>6/19/2024</a:t>
+              <a:t>6/25/2024</a:t>
             </a:fld>
             <a:endParaRPr lang="en-US"/>
           </a:p>
@@ -5520,7 +5604,7 @@
           <a:p>
             <a:fld id="{E393BBCA-9B99-451E-A2F9-AA382E63F3EB}" type="datetime1">
               <a:rPr lang="en-US" smtClean="0"/>
-              <a:t>6/19/2024</a:t>
+              <a:t>6/25/2024</a:t>
             </a:fld>
             <a:endParaRPr lang="en-US"/>
           </a:p>
@@ -6047,7 +6131,7 @@
           <a:p>
             <a:fld id="{D6E2F156-B823-4FCD-8500-2C801BEF89A0}" type="datetime1">
               <a:rPr lang="en-US" smtClean="0"/>
-              <a:t>6/19/2024</a:t>
+              <a:t>6/25/2024</a:t>
             </a:fld>
             <a:endParaRPr lang="en-US"/>
           </a:p>
@@ -6794,7 +6878,7 @@
           <a:p>
             <a:fld id="{64601F53-FE17-4660-BE69-DE27478D4CCC}" type="datetime1">
               <a:rPr lang="en-US" smtClean="0"/>
-              <a:t>6/19/2024</a:t>
+              <a:t>6/25/2024</a:t>
             </a:fld>
             <a:endParaRPr lang="en-US"/>
           </a:p>
@@ -7380,7 +7464,7 @@
           <a:p>
             <a:fld id="{64601F53-FE17-4660-BE69-DE27478D4CCC}" type="datetime1">
               <a:rPr lang="en-US" smtClean="0"/>
-              <a:t>6/19/2024</a:t>
+              <a:t>6/25/2024</a:t>
             </a:fld>
             <a:endParaRPr lang="en-US"/>
           </a:p>
@@ -7872,7 +7956,7 @@
           <a:p>
             <a:fld id="{64601F53-FE17-4660-BE69-DE27478D4CCC}" type="datetime1">
               <a:rPr lang="en-US" smtClean="0"/>
-              <a:t>6/19/2024</a:t>
+              <a:t>6/25/2024</a:t>
             </a:fld>
             <a:endParaRPr lang="en-US"/>
           </a:p>
@@ -8472,7 +8556,7 @@
           <a:p>
             <a:fld id="{64601F53-FE17-4660-BE69-DE27478D4CCC}" type="datetime1">
               <a:rPr lang="en-US" smtClean="0"/>
-              <a:t>6/19/2024</a:t>
+              <a:t>6/25/2024</a:t>
             </a:fld>
             <a:endParaRPr lang="en-US"/>
           </a:p>
@@ -9245,7 +9329,7 @@
           <a:p>
             <a:fld id="{64601F53-FE17-4660-BE69-DE27478D4CCC}" type="datetime1">
               <a:rPr lang="en-US" smtClean="0"/>
-              <a:t>6/19/2024</a:t>
+              <a:t>6/25/2024</a:t>
             </a:fld>
             <a:endParaRPr lang="en-US"/>
           </a:p>
@@ -10008,7 +10092,7 @@
           <a:p>
             <a:fld id="{64601F53-FE17-4660-BE69-DE27478D4CCC}" type="datetime1">
               <a:rPr lang="en-US" smtClean="0"/>
-              <a:t>6/19/2024</a:t>
+              <a:t>6/25/2024</a:t>
             </a:fld>
             <a:endParaRPr lang="en-US"/>
           </a:p>
@@ -10778,7 +10862,7 @@
           <a:p>
             <a:fld id="{D1A98742-6638-43AC-A30F-B0F4E802E4B2}" type="datetime1">
               <a:rPr lang="en-US" smtClean="0"/>
-              <a:t>6/19/2024</a:t>
+              <a:t>6/25/2024</a:t>
             </a:fld>
             <a:endParaRPr lang="en-US"/>
           </a:p>
@@ -10988,7 +11072,7 @@
           <a:p>
             <a:fld id="{D1A98742-6638-43AC-A30F-B0F4E802E4B2}" type="datetime1">
               <a:rPr lang="en-US" smtClean="0"/>
-              <a:t>6/19/2024</a:t>
+              <a:t>6/25/2024</a:t>
             </a:fld>
             <a:endParaRPr lang="en-US"/>
           </a:p>
@@ -11171,15 +11255,7 @@
             </a:r>
             <a:r>
               <a:rPr lang="en-US" dirty="0"/>
-              <a:t>: In LEWG (Split out and built </a:t>
-            </a:r>
-            <a:r>
-              <a:rPr lang="en-US" dirty="0" err="1"/>
-              <a:t>built</a:t>
-            </a:r>
-            <a:r>
-              <a:rPr lang="en-US" dirty="0"/>
-              <a:t> on top of P2786.  Where these facilities overlap with P1144, they are nearly identical.)</a:t>
+              <a:t>: In LEWG (Split out and built on top of P2786.  Where these facilities overlap with P1144, they are very similar.)</a:t>
             </a:r>
           </a:p>
           <a:p>
@@ -11249,7 +11325,7 @@
           <a:p>
             <a:fld id="{D1A98742-6638-43AC-A30F-B0F4E802E4B2}" type="datetime1">
               <a:rPr lang="en-US" smtClean="0"/>
-              <a:t>6/19/2024</a:t>
+              <a:t>6/25/2024</a:t>
             </a:fld>
             <a:endParaRPr lang="en-US"/>
           </a:p>
@@ -11464,7 +11540,7 @@
           <a:p>
             <a:fld id="{D1A98742-6638-43AC-A30F-B0F4E802E4B2}" type="datetime1">
               <a:rPr lang="en-US" smtClean="0"/>
-              <a:t>6/19/2024</a:t>
+              <a:t>6/25/2024</a:t>
             </a:fld>
             <a:endParaRPr lang="en-US"/>
           </a:p>
@@ -11680,7 +11756,7 @@
           <a:p>
             <a:fld id="{D1A98742-6638-43AC-A30F-B0F4E802E4B2}" type="datetime1">
               <a:rPr lang="en-US" smtClean="0"/>
-              <a:t>6/19/2024</a:t>
+              <a:t>6/25/2024</a:t>
             </a:fld>
             <a:endParaRPr lang="en-US"/>
           </a:p>
@@ -11832,7 +11908,7 @@
           <a:p>
             <a:r>
               <a:rPr lang="en-US" dirty="0"/>
-              <a:t>Trivially copiable types are trivially relocatable</a:t>
+              <a:t>Trivially copyable types are trivially relocatable (unless marked otherwise)</a:t>
             </a:r>
           </a:p>
           <a:p>
@@ -11951,7 +12027,7 @@
           <a:p>
             <a:fld id="{D1A98742-6638-43AC-A30F-B0F4E802E4B2}" type="datetime1">
               <a:rPr lang="en-US" smtClean="0"/>
-              <a:t>6/19/2024</a:t>
+              <a:t>6/25/2024</a:t>
             </a:fld>
             <a:endParaRPr lang="en-US"/>
           </a:p>
@@ -12096,7 +12172,7 @@
           <a:p>
             <a:fld id="{64601F53-FE17-4660-BE69-DE27478D4CCC}" type="datetime1">
               <a:rPr lang="en-US" smtClean="0"/>
-              <a:t>6/19/2024</a:t>
+              <a:t>6/25/2024</a:t>
             </a:fld>
             <a:endParaRPr lang="en-US"/>
           </a:p>
@@ -12814,7 +12890,7 @@
           <a:p>
             <a:fld id="{D1A98742-6638-43AC-A30F-B0F4E802E4B2}" type="datetime1">
               <a:rPr lang="en-US" smtClean="0"/>
-              <a:t>6/19/2024</a:t>
+              <a:t>6/25/2024</a:t>
             </a:fld>
             <a:endParaRPr lang="en-US"/>
           </a:p>
@@ -13261,7 +13337,7 @@
           <a:p>
             <a:fld id="{D1A98742-6638-43AC-A30F-B0F4E802E4B2}" type="datetime1">
               <a:rPr lang="en-US" smtClean="0"/>
-              <a:t>6/19/2024</a:t>
+              <a:t>6/25/2024</a:t>
             </a:fld>
             <a:endParaRPr lang="en-US"/>
           </a:p>
@@ -13495,7 +13571,7 @@
           <a:p>
             <a:fld id="{D1A98742-6638-43AC-A30F-B0F4E802E4B2}" type="datetime1">
               <a:rPr lang="en-US" smtClean="0"/>
-              <a:t>6/19/2024</a:t>
+              <a:t>6/25/2024</a:t>
             </a:fld>
             <a:endParaRPr lang="en-US"/>
           </a:p>
@@ -14037,7 +14113,7 @@
           <a:p>
             <a:fld id="{D1A98742-6638-43AC-A30F-B0F4E802E4B2}" type="datetime1">
               <a:rPr lang="en-US" smtClean="0"/>
-              <a:t>6/19/2024</a:t>
+              <a:t>6/25/2024</a:t>
             </a:fld>
             <a:endParaRPr lang="en-US"/>
           </a:p>
@@ -14206,7 +14282,7 @@
           <a:p>
             <a:r>
               <a:rPr lang="en-US" dirty="0"/>
-              <a:t>Swap differs from relocation in that the objects being swapped are not constructed or destroyed.</a:t>
+              <a:t>Swap differs from relocation in that the objects being swapped are neither constructed nor destroyed.</a:t>
             </a:r>
           </a:p>
           <a:p>
@@ -14321,7 +14397,7 @@
           <a:p>
             <a:fld id="{D1A98742-6638-43AC-A30F-B0F4E802E4B2}" type="datetime1">
               <a:rPr lang="en-US" smtClean="0"/>
-              <a:t>6/19/2024</a:t>
+              <a:t>6/25/2024</a:t>
             </a:fld>
             <a:endParaRPr lang="en-US"/>
           </a:p>
@@ -14537,7 +14613,7 @@
           <a:p>
             <a:fld id="{D1A98742-6638-43AC-A30F-B0F4E802E4B2}" type="datetime1">
               <a:rPr lang="en-US" smtClean="0"/>
-              <a:t>6/19/2024</a:t>
+              <a:t>6/25/2024</a:t>
             </a:fld>
             <a:endParaRPr lang="en-US" dirty="0"/>
           </a:p>
@@ -15766,7 +15842,7 @@
           <a:p>
             <a:fld id="{D1A98742-6638-43AC-A30F-B0F4E802E4B2}" type="datetime1">
               <a:rPr lang="en-US" smtClean="0"/>
-              <a:t>6/19/2024</a:t>
+              <a:t>6/25/2024</a:t>
             </a:fld>
             <a:endParaRPr lang="en-US" dirty="0"/>
           </a:p>
@@ -16252,7 +16328,7 @@
           <a:p>
             <a:fld id="{D1A98742-6638-43AC-A30F-B0F4E802E4B2}" type="datetime1">
               <a:rPr lang="en-US" smtClean="0"/>
-              <a:t>6/19/2024</a:t>
+              <a:t>6/25/2024</a:t>
             </a:fld>
             <a:endParaRPr lang="en-US" dirty="0"/>
           </a:p>
@@ -16523,14 +16599,6 @@
               <a:rPr lang="en-US" dirty="0">
                 <a:latin typeface="Consolas" panose="020B0609020204030204" pitchFamily="49" charset="0"/>
               </a:rPr>
-              <a:t>using std::swap;</a:t>
-            </a:r>
-          </a:p>
-          <a:p>
-            <a:r>
-              <a:rPr lang="en-US" dirty="0">
-                <a:latin typeface="Consolas" panose="020B0609020204030204" pitchFamily="49" charset="0"/>
-              </a:rPr>
               <a:t>class C {</a:t>
             </a:r>
           </a:p>
@@ -16564,15 +16632,15 @@
               <a:rPr lang="en-US" dirty="0">
                 <a:latin typeface="Consolas" panose="020B0609020204030204" pitchFamily="49" charset="0"/>
               </a:rPr>
-              <a:t>)</a:t>
-            </a:r>
-          </a:p>
-          <a:p>
-            <a:r>
-              <a:rPr lang="en-US" dirty="0">
-                <a:latin typeface="Consolas" panose="020B0609020204030204" pitchFamily="49" charset="0"/>
-              </a:rPr>
-              <a:t>    { auto l = std::tie(x, y), r = std::tie(</a:t>
+              <a:t>) {</a:t>
+            </a:r>
+          </a:p>
+          <a:p>
+            <a:r>
+              <a:rPr lang="en-US" dirty="0">
+                <a:latin typeface="Consolas" panose="020B0609020204030204" pitchFamily="49" charset="0"/>
+              </a:rPr>
+              <a:t>    auto l = std::tie(x, y), r = std::tie(</a:t>
             </a:r>
             <a:r>
               <a:rPr lang="en-US" dirty="0" err="1">
@@ -16596,7 +16664,7 @@
               <a:rPr lang="en-US" dirty="0">
                 <a:latin typeface="Consolas" panose="020B0609020204030204" pitchFamily="49" charset="0"/>
               </a:rPr>
-              <a:t>); </a:t>
+              <a:t>); std::</a:t>
             </a:r>
             <a:r>
               <a:rPr lang="en-US" dirty="0">
@@ -16611,7 +16679,15 @@
               <a:rPr lang="en-US" dirty="0">
                 <a:latin typeface="Consolas" panose="020B0609020204030204" pitchFamily="49" charset="0"/>
               </a:rPr>
-              <a:t>; }</a:t>
+              <a:t>;</a:t>
+            </a:r>
+          </a:p>
+          <a:p>
+            <a:r>
+              <a:rPr lang="en-US" dirty="0">
+                <a:latin typeface="Consolas" panose="020B0609020204030204" pitchFamily="49" charset="0"/>
+              </a:rPr>
+              <a:t>  }</a:t>
             </a:r>
           </a:p>
           <a:p>
@@ -16638,13 +16714,13 @@
         </p:nvSpPr>
         <p:spPr>
           <a:xfrm>
-            <a:off x="6493666" y="4468705"/>
+            <a:off x="6615586" y="4455158"/>
             <a:ext cx="4438242" cy="643466"/>
           </a:xfrm>
           <a:prstGeom prst="wedgeRoundRectCallout">
             <a:avLst>
-              <a:gd name="adj1" fmla="val 20127"/>
-              <a:gd name="adj2" fmla="val 125840"/>
+              <a:gd name="adj1" fmla="val 25163"/>
+              <a:gd name="adj2" fmla="val 101630"/>
               <a:gd name="adj3" fmla="val 16667"/>
             </a:avLst>
           </a:prstGeom>
@@ -17189,7 +17265,7 @@
               <a:rPr lang="en-US" dirty="0">
                 <a:cs typeface="Courier New" panose="02070309020205020404" pitchFamily="49" charset="0"/>
               </a:rPr>
-              <a:t> is not an implicit-lifetime, trivially copiable type.</a:t>
+              <a:t> is not an implicit-lifetime, trivially copyable type.</a:t>
             </a:r>
           </a:p>
           <a:p>
@@ -17276,7 +17352,7 @@
           <a:p>
             <a:fld id="{D1A98742-6638-43AC-A30F-B0F4E802E4B2}" type="datetime1">
               <a:rPr lang="en-US" smtClean="0"/>
-              <a:t>6/19/2024</a:t>
+              <a:t>6/25/2024</a:t>
             </a:fld>
             <a:endParaRPr lang="en-US"/>
           </a:p>
@@ -17832,7 +17908,7 @@
           <a:p>
             <a:fld id="{D1A98742-6638-43AC-A30F-B0F4E802E4B2}" type="datetime1">
               <a:rPr lang="en-US" smtClean="0"/>
-              <a:t>6/19/2024</a:t>
+              <a:t>6/25/2024</a:t>
             </a:fld>
             <a:endParaRPr lang="en-US"/>
           </a:p>
@@ -17986,7 +18062,18 @@
           <a:p>
             <a:r>
               <a:rPr lang="en-US" dirty="0"/>
-              <a:t>P2786/P3239: Permits relocating move optimizations within containers but no relocating swap optimizations.</a:t>
+              <a:t>P2786/P3239: Permits relocating move optimizations for </a:t>
+            </a:r>
+            <a:r>
+              <a:rPr lang="en-US" dirty="0" err="1">
+                <a:latin typeface="Courier New" panose="02070309020205020404" pitchFamily="49" charset="0"/>
+                <a:cs typeface="Courier New" panose="02070309020205020404" pitchFamily="49" charset="0"/>
+              </a:rPr>
+              <a:t>ValueWithId</a:t>
+            </a:r>
+            <a:r>
+              <a:rPr lang="en-US" dirty="0"/>
+              <a:t> within containers but not relocating swap optimizations.</a:t>
             </a:r>
           </a:p>
           <a:p>
@@ -18031,7 +18118,7 @@
           <a:p>
             <a:fld id="{64601F53-FE17-4660-BE69-DE27478D4CCC}" type="datetime1">
               <a:rPr lang="en-US" smtClean="0"/>
-              <a:t>6/19/2024</a:t>
+              <a:t>6/25/2024</a:t>
             </a:fld>
             <a:endParaRPr lang="en-US"/>
           </a:p>
@@ -19027,7 +19114,7 @@
           <a:p>
             <a:fld id="{D1A98742-6638-43AC-A30F-B0F4E802E4B2}" type="datetime1">
               <a:rPr lang="en-US" smtClean="0"/>
-              <a:t>6/19/2024</a:t>
+              <a:t>6/25/2024</a:t>
             </a:fld>
             <a:endParaRPr lang="en-US"/>
           </a:p>
@@ -19182,7 +19269,7 @@
           <a:p>
             <a:fld id="{64601F53-FE17-4660-BE69-DE27478D4CCC}" type="datetime1">
               <a:rPr lang="en-US" smtClean="0"/>
-              <a:t>6/19/2024</a:t>
+              <a:t>6/25/2024</a:t>
             </a:fld>
             <a:endParaRPr lang="en-US"/>
           </a:p>
@@ -19435,7 +19522,21 @@
               <a:rPr lang="en-US" sz="1600" dirty="0">
                 <a:latin typeface="Consolas" panose="020B0609020204030204" pitchFamily="49" charset="0"/>
               </a:rPr>
-              <a:t>optional&lt;T&amp;&gt;</a:t>
+              <a:t>optional&lt;T</a:t>
+            </a:r>
+            <a:r>
+              <a:rPr lang="en-US" sz="1600">
+                <a:latin typeface="Consolas" panose="020B0609020204030204" pitchFamily="49" charset="0"/>
+              </a:rPr>
+              <a:t>&amp;&gt;  </a:t>
+            </a:r>
+            <a:r>
+              <a:rPr lang="en-US" sz="1600" i="1"/>
+              <a:t>(as proposed in </a:t>
+            </a:r>
+            <a:r>
+              <a:rPr lang="en-US" sz="1600" i="1" dirty="0"/>
+              <a:t>P2988)</a:t>
             </a:r>
           </a:p>
           <a:p>
@@ -19914,7 +20015,7 @@
         <p:spPr>
           <a:xfrm>
             <a:off x="3740795" y="1540101"/>
-            <a:ext cx="6984604" cy="646331"/>
+            <a:ext cx="7564891" cy="646331"/>
           </a:xfrm>
           <a:prstGeom prst="rect">
             <a:avLst/>
@@ -19929,7 +20030,18 @@
           <a:p>
             <a:r>
               <a:rPr lang="en-US" dirty="0"/>
-              <a:t>R = Container-element relocation optimization, S = Swap optimization</a:t>
+              <a:t>R = Container-element relocation optimization, S = </a:t>
+            </a:r>
+            <a:r>
+              <a:rPr lang="en-US" dirty="0">
+                <a:latin typeface="Courier New" panose="02070309020205020404" pitchFamily="49" charset="0"/>
+                <a:cs typeface="Courier New" panose="02070309020205020404" pitchFamily="49" charset="0"/>
+              </a:rPr>
+              <a:t>std::swap</a:t>
+            </a:r>
+            <a:r>
+              <a:rPr lang="en-US" dirty="0"/>
+              <a:t> optimization</a:t>
             </a:r>
             <a:br>
               <a:rPr lang="en-US" dirty="0"/>
@@ -20423,7 +20535,7 @@
           <a:p>
             <a:fld id="{D1A98742-6638-43AC-A30F-B0F4E802E4B2}" type="datetime1">
               <a:rPr lang="en-US" smtClean="0"/>
-              <a:t>6/19/2024</a:t>
+              <a:t>6/25/2024</a:t>
             </a:fld>
             <a:endParaRPr lang="en-US"/>
           </a:p>
@@ -21763,7 +21875,7 @@
           <a:p>
             <a:fld id="{D1A98742-6638-43AC-A30F-B0F4E802E4B2}" type="datetime1">
               <a:rPr lang="en-US" smtClean="0"/>
-              <a:t>6/19/2024</a:t>
+              <a:t>6/25/2024</a:t>
             </a:fld>
             <a:endParaRPr lang="en-US"/>
           </a:p>
@@ -22122,7 +22234,7 @@
           <a:p>
             <a:fld id="{D1A98742-6638-43AC-A30F-B0F4E802E4B2}" type="datetime1">
               <a:rPr lang="en-US" smtClean="0"/>
-              <a:t>6/19/2024</a:t>
+              <a:t>6/25/2024</a:t>
             </a:fld>
             <a:endParaRPr lang="en-US"/>
           </a:p>
@@ -22486,7 +22598,7 @@
           <a:p>
             <a:fld id="{D1A98742-6638-43AC-A30F-B0F4E802E4B2}" type="datetime1">
               <a:rPr lang="en-US" smtClean="0"/>
-              <a:t>6/19/2024</a:t>
+              <a:t>6/25/2024</a:t>
             </a:fld>
             <a:endParaRPr lang="en-US"/>
           </a:p>
@@ -22812,7 +22924,7 @@
           <a:p>
             <a:fld id="{D1A98742-6638-43AC-A30F-B0F4E802E4B2}" type="datetime1">
               <a:rPr lang="en-US" smtClean="0"/>
-              <a:t>6/19/2024</a:t>
+              <a:t>6/25/2024</a:t>
             </a:fld>
             <a:endParaRPr lang="en-US"/>
           </a:p>
@@ -23105,7 +23217,18 @@
           <a:p>
             <a:r>
               <a:rPr lang="en-US" dirty="0"/>
-              <a:t>No: It has semantic meaning and is part of the contract for a type.  Adding or removing the attribute from a correct program can change observable semantics.</a:t>
+              <a:t>No: It has semantic meaning and is part of the contract for a type.  Adding or removing the attribute from a correct program can change observable semantics, e.g., the result of </a:t>
+            </a:r>
+            <a:r>
+              <a:rPr lang="en-US" dirty="0" err="1">
+                <a:latin typeface="Courier New" panose="02070309020205020404" pitchFamily="49" charset="0"/>
+                <a:cs typeface="Courier New" panose="02070309020205020404" pitchFamily="49" charset="0"/>
+              </a:rPr>
+              <a:t>is_trivially_relocatable_v</a:t>
+            </a:r>
+            <a:r>
+              <a:rPr lang="en-US" dirty="0"/>
+              <a:t>.</a:t>
             </a:r>
           </a:p>
         </p:txBody>
@@ -23133,7 +23256,7 @@
           <a:p>
             <a:fld id="{D1A98742-6638-43AC-A30F-B0F4E802E4B2}" type="datetime1">
               <a:rPr lang="en-US" smtClean="0"/>
-              <a:t>6/19/2024</a:t>
+              <a:t>6/25/2024</a:t>
             </a:fld>
             <a:endParaRPr lang="en-US"/>
           </a:p>
@@ -23569,7 +23692,7 @@
           <a:p>
             <a:fld id="{D1A98742-6638-43AC-A30F-B0F4E802E4B2}" type="datetime1">
               <a:rPr lang="en-US" smtClean="0"/>
-              <a:t>6/19/2024</a:t>
+              <a:t>6/25/2024</a:t>
             </a:fld>
             <a:endParaRPr lang="en-US"/>
           </a:p>
@@ -23707,9 +23830,16 @@
             <p:ph idx="1"/>
           </p:nvPr>
         </p:nvSpPr>
-        <p:spPr/>
-        <p:txBody>
-          <a:bodyPr/>
+        <p:spPr>
+          <a:xfrm>
+            <a:off x="1484310" y="1887167"/>
+            <a:ext cx="10018713" cy="4357846"/>
+          </a:xfrm>
+        </p:spPr>
+        <p:txBody>
+          <a:bodyPr>
+            <a:normAutofit/>
+          </a:bodyPr>
           <a:lstStyle/>
           <a:p>
             <a:r>
@@ -23757,7 +23887,18 @@
             <a:pPr lvl="1"/>
             <a:r>
               <a:rPr lang="en-US" dirty="0"/>
-              <a:t>Some types might vary across implementations (e.g., MSVC std::list would be relocatable, but </a:t>
+              <a:t>Some types might vary across implementations (e.g., </a:t>
+            </a:r>
+            <a:r>
+              <a:rPr lang="en-US" dirty="0">
+                <a:latin typeface="Courier New" panose="02070309020205020404" pitchFamily="49" charset="0"/>
+                <a:cs typeface="Courier New" panose="02070309020205020404" pitchFamily="49" charset="0"/>
+              </a:rPr>
+              <a:t>std::list</a:t>
+            </a:r>
+            <a:r>
+              <a:rPr lang="en-US" dirty="0"/>
+              <a:t> could b trivially relocatable using the current MSVC implementation, but not using the current </a:t>
             </a:r>
             <a:r>
               <a:rPr lang="en-US" dirty="0" err="1"/>
@@ -23765,7 +23906,7 @@
             </a:r>
             <a:r>
               <a:rPr lang="en-US" dirty="0"/>
-              <a:t>++ std::list cannot be).</a:t>
+              <a:t>++ implementation).</a:t>
             </a:r>
           </a:p>
         </p:txBody>
@@ -23793,7 +23934,7 @@
           <a:p>
             <a:fld id="{D1A98742-6638-43AC-A30F-B0F4E802E4B2}" type="datetime1">
               <a:rPr lang="en-US" smtClean="0"/>
-              <a:t>6/19/2024</a:t>
+              <a:t>6/25/2024</a:t>
             </a:fld>
             <a:endParaRPr lang="en-US"/>
           </a:p>
@@ -24214,7 +24355,7 @@
           <a:p>
             <a:fld id="{D1A98742-6638-43AC-A30F-B0F4E802E4B2}" type="datetime1">
               <a:rPr lang="en-US" smtClean="0"/>
-              <a:t>6/19/2024</a:t>
+              <a:t>6/25/2024</a:t>
             </a:fld>
             <a:endParaRPr lang="en-US"/>
           </a:p>
@@ -24593,7 +24734,7 @@
           <a:p>
             <a:fld id="{D1A98742-6638-43AC-A30F-B0F4E802E4B2}" type="datetime1">
               <a:rPr lang="en-US" smtClean="0"/>
-              <a:t>6/19/2024</a:t>
+              <a:t>6/25/2024</a:t>
             </a:fld>
             <a:endParaRPr lang="en-US"/>
           </a:p>
@@ -24763,7 +24904,7 @@
           <a:p>
             <a:fld id="{E04F68CC-AE29-43DC-8C36-74D991BDD660}" type="datetime1">
               <a:rPr lang="en-US" smtClean="0"/>
-              <a:t>6/19/2024</a:t>
+              <a:t>6/25/2024</a:t>
             </a:fld>
             <a:endParaRPr lang="en-US"/>
           </a:p>
@@ -24978,7 +25119,7 @@
           <a:p>
             <a:fld id="{D1A98742-6638-43AC-A30F-B0F4E802E4B2}" type="datetime1">
               <a:rPr lang="en-US" smtClean="0"/>
-              <a:t>6/19/2024</a:t>
+              <a:t>6/25/2024</a:t>
             </a:fld>
             <a:endParaRPr lang="en-US"/>
           </a:p>
@@ -25123,7 +25264,7 @@
           <a:p>
             <a:fld id="{64601F53-FE17-4660-BE69-DE27478D4CCC}" type="datetime1">
               <a:rPr lang="en-US" smtClean="0"/>
-              <a:t>6/19/2024</a:t>
+              <a:t>6/25/2024</a:t>
             </a:fld>
             <a:endParaRPr lang="en-US"/>
           </a:p>
@@ -25763,7 +25904,7 @@
           <a:p>
             <a:fld id="{D1A98742-6638-43AC-A30F-B0F4E802E4B2}" type="datetime1">
               <a:rPr lang="en-US" smtClean="0"/>
-              <a:t>6/19/2024</a:t>
+              <a:t>6/25/2024</a:t>
             </a:fld>
             <a:endParaRPr lang="en-US"/>
           </a:p>
@@ -26564,20 +26705,39 @@
             <p:ph idx="1"/>
           </p:nvPr>
         </p:nvSpPr>
-        <p:spPr/>
-        <p:txBody>
-          <a:bodyPr/>
+        <p:spPr>
+          <a:xfrm>
+            <a:off x="1484310" y="1887167"/>
+            <a:ext cx="10018713" cy="4340518"/>
+          </a:xfrm>
+        </p:spPr>
+        <p:txBody>
+          <a:bodyPr>
+            <a:normAutofit lnSpcReduction="10000"/>
+          </a:bodyPr>
           <a:lstStyle/>
           <a:p>
             <a:r>
               <a:rPr lang="en-US" dirty="0"/>
-              <a:t>Conceptually, starting the lifetime of the destination object and ending the lifetime of the source object is an atomic operation.</a:t>
-            </a:r>
+              <a:t>Relocation moves an element (e.g., within a collection) to a new address, invalidating references to the old location.</a:t>
+            </a:r>
+          </a:p>
+          <a:p>
+            <a:endParaRPr lang="en-US" dirty="0"/>
+          </a:p>
+          <a:p>
+            <a:endParaRPr lang="en-US" dirty="0"/>
           </a:p>
           <a:p>
             <a:r>
               <a:rPr lang="en-US" dirty="0"/>
-              <a:t>A type can have a throwing move constructor (or no move constructor) yet be </a:t>
+              <a:t>Starting the lifetime of the new object and ending the lifetime of the original object is conceptually an atomic operation.</a:t>
+            </a:r>
+          </a:p>
+          <a:p>
+            <a:r>
+              <a:rPr lang="en-US" dirty="0"/>
+              <a:t>A type can have a deleted or throwing move constructor yet be </a:t>
             </a:r>
             <a:r>
               <a:rPr lang="en-US" dirty="0" err="1"/>
@@ -26635,7 +26795,7 @@
           <a:p>
             <a:fld id="{D1A98742-6638-43AC-A30F-B0F4E802E4B2}" type="datetime1">
               <a:rPr lang="en-US" smtClean="0"/>
-              <a:t>6/19/2024</a:t>
+              <a:t>6/26/2024</a:t>
             </a:fld>
             <a:endParaRPr lang="en-US"/>
           </a:p>
@@ -26696,6 +26856,170 @@
               <a:t>5</a:t>
             </a:fld>
             <a:endParaRPr lang="en-US"/>
+          </a:p>
+        </p:txBody>
+      </p:sp>
+      <p:sp>
+        <p:nvSpPr>
+          <p:cNvPr id="7" name="Rectangle: Rounded Corners 6">
+            <a:extLst>
+              <a:ext uri="{FF2B5EF4-FFF2-40B4-BE49-F238E27FC236}">
+                <a16:creationId xmlns:a16="http://schemas.microsoft.com/office/drawing/2014/main" id="{A4DC4C55-6772-05C7-3C6E-61A47214AD6C}"/>
+              </a:ext>
+            </a:extLst>
+          </p:cNvPr>
+          <p:cNvSpPr/>
+          <p:nvPr/>
+        </p:nvSpPr>
+        <p:spPr>
+          <a:xfrm>
+            <a:off x="3235911" y="2676627"/>
+            <a:ext cx="1264609" cy="841618"/>
+          </a:xfrm>
+          <a:prstGeom prst="roundRect">
+            <a:avLst/>
+          </a:prstGeom>
+          <a:noFill/>
+          <a:ln w="38100">
+            <a:solidFill>
+              <a:srgbClr val="00B0F0"/>
+            </a:solidFill>
+            <a:prstDash val="sysDot"/>
+          </a:ln>
+        </p:spPr>
+        <p:style>
+          <a:lnRef idx="2">
+            <a:schemeClr val="accent6"/>
+          </a:lnRef>
+          <a:fillRef idx="1">
+            <a:schemeClr val="lt1"/>
+          </a:fillRef>
+          <a:effectRef idx="0">
+            <a:schemeClr val="accent6"/>
+          </a:effectRef>
+          <a:fontRef idx="minor">
+            <a:schemeClr val="dk1"/>
+          </a:fontRef>
+        </p:style>
+        <p:txBody>
+          <a:bodyPr rtlCol="0" anchor="ctr"/>
+          <a:lstStyle/>
+          <a:p>
+            <a:endParaRPr lang="en-US" b="1" dirty="0">
+              <a:solidFill>
+                <a:srgbClr val="7030A0"/>
+              </a:solidFill>
+              <a:latin typeface="Consolas" panose="020B0609020204030204" pitchFamily="49" charset="0"/>
+            </a:endParaRPr>
+          </a:p>
+        </p:txBody>
+      </p:sp>
+      <p:sp>
+        <p:nvSpPr>
+          <p:cNvPr id="9" name="Arrow: Right 8">
+            <a:extLst>
+              <a:ext uri="{FF2B5EF4-FFF2-40B4-BE49-F238E27FC236}">
+                <a16:creationId xmlns:a16="http://schemas.microsoft.com/office/drawing/2014/main" id="{428F54BB-33E5-2E9E-3DA9-DD6D530E8BE9}"/>
+              </a:ext>
+            </a:extLst>
+          </p:cNvPr>
+          <p:cNvSpPr/>
+          <p:nvPr/>
+        </p:nvSpPr>
+        <p:spPr>
+          <a:xfrm>
+            <a:off x="4820575" y="2836830"/>
+            <a:ext cx="2479955" cy="537099"/>
+          </a:xfrm>
+          <a:prstGeom prst="rightArrow">
+            <a:avLst/>
+          </a:prstGeom>
+        </p:spPr>
+        <p:style>
+          <a:lnRef idx="2">
+            <a:schemeClr val="accent1">
+              <a:shade val="15000"/>
+            </a:schemeClr>
+          </a:lnRef>
+          <a:fillRef idx="1">
+            <a:schemeClr val="accent1"/>
+          </a:fillRef>
+          <a:effectRef idx="0">
+            <a:schemeClr val="accent1"/>
+          </a:effectRef>
+          <a:fontRef idx="minor">
+            <a:schemeClr val="lt1"/>
+          </a:fontRef>
+        </p:style>
+        <p:txBody>
+          <a:bodyPr rtlCol="0" anchor="ctr"/>
+          <a:lstStyle/>
+          <a:p>
+            <a:pPr algn="ctr"/>
+            <a:r>
+              <a:rPr lang="en-US" b="1" dirty="0"/>
+              <a:t>Relocate</a:t>
+            </a:r>
+          </a:p>
+        </p:txBody>
+      </p:sp>
+      <p:sp>
+        <p:nvSpPr>
+          <p:cNvPr id="8" name="Rectangle: Rounded Corners 7">
+            <a:extLst>
+              <a:ext uri="{FF2B5EF4-FFF2-40B4-BE49-F238E27FC236}">
+                <a16:creationId xmlns:a16="http://schemas.microsoft.com/office/drawing/2014/main" id="{0309C284-4FDA-2877-26EF-ED9B38EBA029}"/>
+              </a:ext>
+            </a:extLst>
+          </p:cNvPr>
+          <p:cNvSpPr/>
+          <p:nvPr/>
+        </p:nvSpPr>
+        <p:spPr>
+          <a:xfrm>
+            <a:off x="3235911" y="2676627"/>
+            <a:ext cx="1264609" cy="841618"/>
+          </a:xfrm>
+          <a:prstGeom prst="roundRect">
+            <a:avLst/>
+          </a:prstGeom>
+          <a:solidFill>
+            <a:schemeClr val="bg1"/>
+          </a:solidFill>
+          <a:ln w="38100">
+            <a:solidFill>
+              <a:srgbClr val="00B0F0"/>
+            </a:solidFill>
+          </a:ln>
+        </p:spPr>
+        <p:style>
+          <a:lnRef idx="2">
+            <a:schemeClr val="accent6"/>
+          </a:lnRef>
+          <a:fillRef idx="1">
+            <a:schemeClr val="lt1"/>
+          </a:fillRef>
+          <a:effectRef idx="0">
+            <a:schemeClr val="accent6"/>
+          </a:effectRef>
+          <a:fontRef idx="minor">
+            <a:schemeClr val="dk1"/>
+          </a:fontRef>
+        </p:style>
+        <p:txBody>
+          <a:bodyPr rtlCol="0" anchor="ctr"/>
+          <a:lstStyle/>
+          <a:p>
+            <a:pPr algn="ctr"/>
+            <a:r>
+              <a:rPr lang="en-US" dirty="0"/>
+              <a:t>element</a:t>
+            </a:r>
+            <a:endParaRPr lang="en-US" b="1" dirty="0">
+              <a:solidFill>
+                <a:srgbClr val="7030A0"/>
+              </a:solidFill>
+            </a:endParaRPr>
           </a:p>
         </p:txBody>
       </p:sp>
@@ -26709,6 +27033,378 @@
   <p:clrMapOvr>
     <a:masterClrMapping/>
   </p:clrMapOvr>
+  <p:timing>
+    <p:tnLst>
+      <p:par>
+        <p:cTn id="1" dur="indefinite" restart="never" nodeType="tmRoot">
+          <p:childTnLst>
+            <p:seq concurrent="1" nextAc="seek">
+              <p:cTn id="2" dur="indefinite" nodeType="mainSeq">
+                <p:childTnLst>
+                  <p:par>
+                    <p:cTn id="3" fill="hold">
+                      <p:stCondLst>
+                        <p:cond delay="indefinite"/>
+                      </p:stCondLst>
+                      <p:childTnLst>
+                        <p:par>
+                          <p:cTn id="4" fill="hold">
+                            <p:stCondLst>
+                              <p:cond delay="0"/>
+                            </p:stCondLst>
+                            <p:childTnLst>
+                              <p:par>
+                                <p:cTn id="5" presetID="1" presetClass="entr" presetSubtype="0" fill="hold" grpId="0" nodeType="clickEffect">
+                                  <p:stCondLst>
+                                    <p:cond delay="0"/>
+                                  </p:stCondLst>
+                                  <p:childTnLst>
+                                    <p:set>
+                                      <p:cBhvr>
+                                        <p:cTn id="6" dur="1" fill="hold">
+                                          <p:stCondLst>
+                                            <p:cond delay="0"/>
+                                          </p:stCondLst>
+                                        </p:cTn>
+                                        <p:tgtEl>
+                                          <p:spTgt spid="3">
+                                            <p:txEl>
+                                              <p:pRg st="0" end="0"/>
+                                            </p:txEl>
+                                          </p:spTgt>
+                                        </p:tgtEl>
+                                        <p:attrNameLst>
+                                          <p:attrName>style.visibility</p:attrName>
+                                        </p:attrNameLst>
+                                      </p:cBhvr>
+                                      <p:to>
+                                        <p:strVal val="visible"/>
+                                      </p:to>
+                                    </p:set>
+                                  </p:childTnLst>
+                                </p:cTn>
+                              </p:par>
+                            </p:childTnLst>
+                          </p:cTn>
+                        </p:par>
+                      </p:childTnLst>
+                    </p:cTn>
+                  </p:par>
+                  <p:par>
+                    <p:cTn id="7" fill="hold">
+                      <p:stCondLst>
+                        <p:cond delay="indefinite"/>
+                      </p:stCondLst>
+                      <p:childTnLst>
+                        <p:par>
+                          <p:cTn id="8" fill="hold">
+                            <p:stCondLst>
+                              <p:cond delay="0"/>
+                            </p:stCondLst>
+                            <p:childTnLst>
+                              <p:par>
+                                <p:cTn id="9" presetID="1" presetClass="entr" presetSubtype="0" fill="hold" grpId="1" nodeType="clickEffect">
+                                  <p:stCondLst>
+                                    <p:cond delay="0"/>
+                                  </p:stCondLst>
+                                  <p:childTnLst>
+                                    <p:set>
+                                      <p:cBhvr>
+                                        <p:cTn id="10" dur="1" fill="hold">
+                                          <p:stCondLst>
+                                            <p:cond delay="0"/>
+                                          </p:stCondLst>
+                                        </p:cTn>
+                                        <p:tgtEl>
+                                          <p:spTgt spid="8"/>
+                                        </p:tgtEl>
+                                        <p:attrNameLst>
+                                          <p:attrName>style.visibility</p:attrName>
+                                        </p:attrNameLst>
+                                      </p:cBhvr>
+                                      <p:to>
+                                        <p:strVal val="visible"/>
+                                      </p:to>
+                                    </p:set>
+                                  </p:childTnLst>
+                                </p:cTn>
+                              </p:par>
+                              <p:par>
+                                <p:cTn id="11" presetID="1" presetClass="entr" presetSubtype="0" fill="hold" grpId="0" nodeType="withEffect">
+                                  <p:stCondLst>
+                                    <p:cond delay="0"/>
+                                  </p:stCondLst>
+                                  <p:childTnLst>
+                                    <p:set>
+                                      <p:cBhvr>
+                                        <p:cTn id="12" dur="1" fill="hold">
+                                          <p:stCondLst>
+                                            <p:cond delay="0"/>
+                                          </p:stCondLst>
+                                        </p:cTn>
+                                        <p:tgtEl>
+                                          <p:spTgt spid="7"/>
+                                        </p:tgtEl>
+                                        <p:attrNameLst>
+                                          <p:attrName>style.visibility</p:attrName>
+                                        </p:attrNameLst>
+                                      </p:cBhvr>
+                                      <p:to>
+                                        <p:strVal val="visible"/>
+                                      </p:to>
+                                    </p:set>
+                                  </p:childTnLst>
+                                </p:cTn>
+                              </p:par>
+                            </p:childTnLst>
+                          </p:cTn>
+                        </p:par>
+                        <p:par>
+                          <p:cTn id="13" fill="hold">
+                            <p:stCondLst>
+                              <p:cond delay="0"/>
+                            </p:stCondLst>
+                            <p:childTnLst>
+                              <p:par>
+                                <p:cTn id="14" presetID="1" presetClass="entr" presetSubtype="0" fill="hold" grpId="0" nodeType="afterEffect">
+                                  <p:stCondLst>
+                                    <p:cond delay="500"/>
+                                  </p:stCondLst>
+                                  <p:childTnLst>
+                                    <p:set>
+                                      <p:cBhvr>
+                                        <p:cTn id="15" dur="1" fill="hold">
+                                          <p:stCondLst>
+                                            <p:cond delay="0"/>
+                                          </p:stCondLst>
+                                        </p:cTn>
+                                        <p:tgtEl>
+                                          <p:spTgt spid="9"/>
+                                        </p:tgtEl>
+                                        <p:attrNameLst>
+                                          <p:attrName>style.visibility</p:attrName>
+                                        </p:attrNameLst>
+                                      </p:cBhvr>
+                                      <p:to>
+                                        <p:strVal val="visible"/>
+                                      </p:to>
+                                    </p:set>
+                                  </p:childTnLst>
+                                </p:cTn>
+                              </p:par>
+                            </p:childTnLst>
+                          </p:cTn>
+                        </p:par>
+                        <p:par>
+                          <p:cTn id="16" fill="hold">
+                            <p:stCondLst>
+                              <p:cond delay="500"/>
+                            </p:stCondLst>
+                            <p:childTnLst>
+                              <p:par>
+                                <p:cTn id="17" presetID="63" presetClass="path" presetSubtype="0" accel="50000" decel="50000" fill="hold" grpId="0" nodeType="afterEffect">
+                                  <p:stCondLst>
+                                    <p:cond delay="0"/>
+                                  </p:stCondLst>
+                                  <p:childTnLst>
+                                    <p:animMotion origin="layout" path="M 2.5E-6 -3.7037E-7 L 0.35312 -3.7037E-7 " pathEditMode="relative" rAng="0" ptsTypes="AA">
+                                      <p:cBhvr>
+                                        <p:cTn id="18" dur="2000" fill="hold"/>
+                                        <p:tgtEl>
+                                          <p:spTgt spid="8"/>
+                                        </p:tgtEl>
+                                        <p:attrNameLst>
+                                          <p:attrName>ppt_x</p:attrName>
+                                          <p:attrName>ppt_y</p:attrName>
+                                        </p:attrNameLst>
+                                      </p:cBhvr>
+                                      <p:rCtr x="17656" y="0"/>
+                                    </p:animMotion>
+                                  </p:childTnLst>
+                                </p:cTn>
+                              </p:par>
+                            </p:childTnLst>
+                          </p:cTn>
+                        </p:par>
+                      </p:childTnLst>
+                    </p:cTn>
+                  </p:par>
+                  <p:par>
+                    <p:cTn id="19" fill="hold">
+                      <p:stCondLst>
+                        <p:cond delay="indefinite"/>
+                      </p:stCondLst>
+                      <p:childTnLst>
+                        <p:par>
+                          <p:cTn id="20" fill="hold">
+                            <p:stCondLst>
+                              <p:cond delay="0"/>
+                            </p:stCondLst>
+                            <p:childTnLst>
+                              <p:par>
+                                <p:cTn id="21" presetID="1" presetClass="entr" presetSubtype="0" fill="hold" grpId="0" nodeType="clickEffect">
+                                  <p:stCondLst>
+                                    <p:cond delay="0"/>
+                                  </p:stCondLst>
+                                  <p:childTnLst>
+                                    <p:set>
+                                      <p:cBhvr>
+                                        <p:cTn id="22" dur="1" fill="hold">
+                                          <p:stCondLst>
+                                            <p:cond delay="0"/>
+                                          </p:stCondLst>
+                                        </p:cTn>
+                                        <p:tgtEl>
+                                          <p:spTgt spid="3">
+                                            <p:txEl>
+                                              <p:pRg st="3" end="3"/>
+                                            </p:txEl>
+                                          </p:spTgt>
+                                        </p:tgtEl>
+                                        <p:attrNameLst>
+                                          <p:attrName>style.visibility</p:attrName>
+                                        </p:attrNameLst>
+                                      </p:cBhvr>
+                                      <p:to>
+                                        <p:strVal val="visible"/>
+                                      </p:to>
+                                    </p:set>
+                                  </p:childTnLst>
+                                </p:cTn>
+                              </p:par>
+                            </p:childTnLst>
+                          </p:cTn>
+                        </p:par>
+                      </p:childTnLst>
+                    </p:cTn>
+                  </p:par>
+                  <p:par>
+                    <p:cTn id="23" fill="hold">
+                      <p:stCondLst>
+                        <p:cond delay="indefinite"/>
+                      </p:stCondLst>
+                      <p:childTnLst>
+                        <p:par>
+                          <p:cTn id="24" fill="hold">
+                            <p:stCondLst>
+                              <p:cond delay="0"/>
+                            </p:stCondLst>
+                            <p:childTnLst>
+                              <p:par>
+                                <p:cTn id="25" presetID="1" presetClass="entr" presetSubtype="0" fill="hold" grpId="0" nodeType="clickEffect">
+                                  <p:stCondLst>
+                                    <p:cond delay="0"/>
+                                  </p:stCondLst>
+                                  <p:childTnLst>
+                                    <p:set>
+                                      <p:cBhvr>
+                                        <p:cTn id="26" dur="1" fill="hold">
+                                          <p:stCondLst>
+                                            <p:cond delay="0"/>
+                                          </p:stCondLst>
+                                        </p:cTn>
+                                        <p:tgtEl>
+                                          <p:spTgt spid="3">
+                                            <p:txEl>
+                                              <p:pRg st="4" end="4"/>
+                                            </p:txEl>
+                                          </p:spTgt>
+                                        </p:tgtEl>
+                                        <p:attrNameLst>
+                                          <p:attrName>style.visibility</p:attrName>
+                                        </p:attrNameLst>
+                                      </p:cBhvr>
+                                      <p:to>
+                                        <p:strVal val="visible"/>
+                                      </p:to>
+                                    </p:set>
+                                  </p:childTnLst>
+                                </p:cTn>
+                              </p:par>
+                            </p:childTnLst>
+                          </p:cTn>
+                        </p:par>
+                      </p:childTnLst>
+                    </p:cTn>
+                  </p:par>
+                  <p:par>
+                    <p:cTn id="27" fill="hold">
+                      <p:stCondLst>
+                        <p:cond delay="indefinite"/>
+                      </p:stCondLst>
+                      <p:childTnLst>
+                        <p:par>
+                          <p:cTn id="28" fill="hold">
+                            <p:stCondLst>
+                              <p:cond delay="0"/>
+                            </p:stCondLst>
+                            <p:childTnLst>
+                              <p:par>
+                                <p:cTn id="29" presetID="1" presetClass="entr" presetSubtype="0" fill="hold" grpId="0" nodeType="clickEffect">
+                                  <p:stCondLst>
+                                    <p:cond delay="0"/>
+                                  </p:stCondLst>
+                                  <p:childTnLst>
+                                    <p:set>
+                                      <p:cBhvr>
+                                        <p:cTn id="30" dur="1" fill="hold">
+                                          <p:stCondLst>
+                                            <p:cond delay="0"/>
+                                          </p:stCondLst>
+                                        </p:cTn>
+                                        <p:tgtEl>
+                                          <p:spTgt spid="3">
+                                            <p:txEl>
+                                              <p:pRg st="5" end="5"/>
+                                            </p:txEl>
+                                          </p:spTgt>
+                                        </p:tgtEl>
+                                        <p:attrNameLst>
+                                          <p:attrName>style.visibility</p:attrName>
+                                        </p:attrNameLst>
+                                      </p:cBhvr>
+                                      <p:to>
+                                        <p:strVal val="visible"/>
+                                      </p:to>
+                                    </p:set>
+                                  </p:childTnLst>
+                                </p:cTn>
+                              </p:par>
+                            </p:childTnLst>
+                          </p:cTn>
+                        </p:par>
+                      </p:childTnLst>
+                    </p:cTn>
+                  </p:par>
+                </p:childTnLst>
+              </p:cTn>
+              <p:prevCondLst>
+                <p:cond evt="onPrev" delay="0">
+                  <p:tgtEl>
+                    <p:sldTgt/>
+                  </p:tgtEl>
+                </p:cond>
+              </p:prevCondLst>
+              <p:nextCondLst>
+                <p:cond evt="onNext" delay="0">
+                  <p:tgtEl>
+                    <p:sldTgt/>
+                  </p:tgtEl>
+                </p:cond>
+              </p:nextCondLst>
+            </p:seq>
+          </p:childTnLst>
+        </p:cTn>
+      </p:par>
+    </p:tnLst>
+    <p:bldLst>
+      <p:bldP spid="3" grpId="0" uiExpand="1" build="p"/>
+      <p:bldP spid="7" grpId="0" animBg="1"/>
+      <p:bldP spid="9" grpId="0" uiExpand="1" animBg="1"/>
+      <p:bldP spid="8" grpId="0" animBg="1"/>
+      <p:bldP spid="8" grpId="1" animBg="1"/>
+    </p:bldLst>
+  </p:timing>
 </p:sld>
 </file>
 
@@ -26775,8 +27471,8 @@
         </p:nvSpPr>
         <p:spPr>
           <a:xfrm>
-            <a:off x="1484310" y="1887166"/>
-            <a:ext cx="10018713" cy="4127553"/>
+            <a:off x="1484310" y="1797728"/>
+            <a:ext cx="10018713" cy="4425519"/>
           </a:xfrm>
         </p:spPr>
         <p:txBody>
@@ -26801,55 +27497,66 @@
           <a:p>
             <a:r>
               <a:rPr lang="en-US" dirty="0"/>
-              <a:t>The implementation can optimize trivial relocation using byte copies.</a:t>
-            </a:r>
-          </a:p>
-          <a:p>
-            <a:r>
-              <a:rPr lang="en-US" dirty="0"/>
-              <a:t>Goals pf P2786 et al.:</a:t>
-            </a:r>
-          </a:p>
-          <a:p>
-            <a:pPr lvl="1"/>
-            <a:r>
-              <a:rPr lang="en-US" dirty="0"/>
-              <a:t>Define trivial relocation syntax and semantics </a:t>
-            </a:r>
-            <a:r>
-              <a:rPr lang="en-US" b="1" dirty="0"/>
-              <a:t>consistent with core language</a:t>
-            </a:r>
-          </a:p>
-          <a:p>
-            <a:pPr lvl="1"/>
-            <a:r>
-              <a:rPr lang="en-US" dirty="0"/>
-              <a:t>Available to users and library authors</a:t>
-            </a:r>
-          </a:p>
-          <a:p>
-            <a:pPr lvl="1"/>
-            <a:r>
-              <a:rPr lang="en-US" dirty="0"/>
-              <a:t>Usable on a wide variety of types, e.g., </a:t>
+              <a:t>The implementation can optimize trivial relocation by copying the object representation (equivalent to </a:t>
             </a:r>
             <a:r>
               <a:rPr lang="en-US" dirty="0" err="1">
                 <a:latin typeface="Courier New" panose="02070309020205020404" pitchFamily="49" charset="0"/>
                 <a:cs typeface="Courier New" panose="02070309020205020404" pitchFamily="49" charset="0"/>
               </a:rPr>
-              <a:t>unique_ptr</a:t>
+              <a:t>memcpy</a:t>
             </a:r>
             <a:r>
               <a:rPr lang="en-US" dirty="0"/>
-              <a:t>, </a:t>
+              <a:t> for typical implementations).</a:t>
+            </a:r>
+          </a:p>
+          <a:p>
+            <a:r>
+              <a:rPr lang="en-US" dirty="0"/>
+              <a:t>Goals pf P2786 et al.:</a:t>
+            </a:r>
+          </a:p>
+          <a:p>
+            <a:pPr lvl="1"/>
+            <a:r>
+              <a:rPr lang="en-US" dirty="0"/>
+              <a:t>Define trivial relocation syntax and semantics </a:t>
+            </a:r>
+            <a:r>
+              <a:rPr lang="en-US" b="1" dirty="0"/>
+              <a:t>consistent with core language</a:t>
+            </a:r>
+          </a:p>
+          <a:p>
+            <a:pPr lvl="1"/>
+            <a:r>
+              <a:rPr lang="en-US" dirty="0"/>
+              <a:t>Available to users and library authors</a:t>
+            </a:r>
+          </a:p>
+          <a:p>
+            <a:pPr lvl="1"/>
+            <a:r>
+              <a:rPr lang="en-US" dirty="0"/>
+              <a:t>Usable on a wide variety of types, e.g., </a:t>
             </a:r>
             <a:r>
               <a:rPr lang="en-US" dirty="0" err="1">
                 <a:latin typeface="Courier New" panose="02070309020205020404" pitchFamily="49" charset="0"/>
                 <a:cs typeface="Courier New" panose="02070309020205020404" pitchFamily="49" charset="0"/>
               </a:rPr>
+              <a:t>unique_ptr</a:t>
+            </a:r>
+            <a:r>
+              <a:rPr lang="en-US" dirty="0"/>
+              <a:t>, </a:t>
+            </a:r>
+            <a:r>
+              <a:rPr lang="en-US" dirty="0" err="1">
+                <a:latin typeface="Courier New" panose="02070309020205020404" pitchFamily="49" charset="0"/>
+                <a:cs typeface="Courier New" panose="02070309020205020404" pitchFamily="49" charset="0"/>
+              </a:rPr>
               <a:t>pmr</a:t>
             </a:r>
             <a:r>
@@ -26872,7 +27579,7 @@
             <a:pPr lvl="1"/>
             <a:r>
               <a:rPr lang="en-US" dirty="0"/>
-              <a:t>Implicitly enabled for safe cases (e.g., trivially copiable types)</a:t>
+              <a:t>Implicitly enabled for safe cases (e.g., trivially copyable types)</a:t>
             </a:r>
           </a:p>
           <a:p>
@@ -26907,7 +27614,7 @@
           <a:p>
             <a:fld id="{D1A98742-6638-43AC-A30F-B0F4E802E4B2}" type="datetime1">
               <a:rPr lang="en-US" smtClean="0"/>
-              <a:t>6/19/2024</a:t>
+              <a:t>6/25/2024</a:t>
             </a:fld>
             <a:endParaRPr lang="en-US"/>
           </a:p>
@@ -26935,7 +27642,7 @@
           <a:lstStyle/>
           <a:p>
             <a:r>
-              <a:rPr lang="en-US"/>
+              <a:rPr lang="en-US" dirty="0"/>
               <a:t>Pablo Halpern, 2024 (CC BY 4.0)</a:t>
             </a:r>
           </a:p>
@@ -27184,7 +27891,7 @@
           <a:p>
             <a:fld id="{D1A98742-6638-43AC-A30F-B0F4E802E4B2}" type="datetime1">
               <a:rPr lang="en-US" smtClean="0"/>
-              <a:t>6/19/2024</a:t>
+              <a:t>6/25/2024</a:t>
             </a:fld>
             <a:endParaRPr lang="en-US"/>
           </a:p>
@@ -28571,7 +29278,7 @@
                   <a:srgbClr val="7030A0"/>
                 </a:solidFill>
               </a:rPr>
-              <a:t> is neither implicit-lifetime nor trivially copiable, but it could be </a:t>
+              <a:t> is neither implicit-lifetime nor trivially copyable, but it could be </a:t>
             </a:r>
             <a:r>
               <a:rPr lang="en-US" b="1" i="1" dirty="0">
@@ -28618,7 +29325,7 @@
           <a:p>
             <a:fld id="{D1A98742-6638-43AC-A30F-B0F4E802E4B2}" type="datetime1">
               <a:rPr lang="en-US" smtClean="0"/>
-              <a:t>6/19/2024</a:t>
+              <a:t>6/25/2024</a:t>
             </a:fld>
             <a:endParaRPr lang="en-US"/>
           </a:p>
@@ -29591,7 +30298,7 @@
           <a:p>
             <a:fld id="{64601F53-FE17-4660-BE69-DE27478D4CCC}" type="datetime1">
               <a:rPr lang="en-US" smtClean="0"/>
-              <a:t>6/19/2024</a:t>
+              <a:t>6/25/2024</a:t>
             </a:fld>
             <a:endParaRPr lang="en-US"/>
           </a:p>
@@ -29769,10 +30476,12 @@
           <a:prstGeom prst="roundRect">
             <a:avLst/>
           </a:prstGeom>
+          <a:noFill/>
           <a:ln w="38100">
             <a:solidFill>
               <a:srgbClr val="00B0F0"/>
             </a:solidFill>
+            <a:prstDash val="sysDot"/>
           </a:ln>
         </p:spPr>
         <p:style>
@@ -29793,53 +30502,12 @@
           <a:bodyPr rtlCol="0" anchor="ctr"/>
           <a:lstStyle/>
           <a:p>
-            <a:r>
-              <a:rPr lang="en-US" dirty="0" err="1">
-                <a:latin typeface="Consolas" panose="020B0609020204030204" pitchFamily="49" charset="0"/>
-              </a:rPr>
-              <a:t>m_ptr</a:t>
-            </a:r>
-            <a:r>
-              <a:rPr lang="en-US" dirty="0">
-                <a:latin typeface="Consolas" panose="020B0609020204030204" pitchFamily="49" charset="0"/>
-              </a:rPr>
-              <a:t>     = </a:t>
-            </a:r>
-            <a:r>
-              <a:rPr lang="en-US" b="1" dirty="0">
-                <a:solidFill>
-                  <a:srgbClr val="7030A0"/>
-                </a:solidFill>
-                <a:latin typeface="Consolas" panose="020B0609020204030204" pitchFamily="49" charset="0"/>
-              </a:rPr>
-              <a:t>A</a:t>
-            </a:r>
-            <a:br>
-              <a:rPr lang="en-US" dirty="0">
-                <a:latin typeface="Consolas" panose="020B0609020204030204" pitchFamily="49" charset="0"/>
-              </a:rPr>
-            </a:br>
-            <a:r>
-              <a:rPr lang="en-US" dirty="0" err="1">
-                <a:latin typeface="Consolas" panose="020B0609020204030204" pitchFamily="49" charset="0"/>
-              </a:rPr>
-              <a:t>m_own_ptr</a:t>
-            </a:r>
-            <a:r>
-              <a:rPr lang="en-US" dirty="0">
-                <a:latin typeface="Consolas" panose="020B0609020204030204" pitchFamily="49" charset="0"/>
-              </a:rPr>
-              <a:t> = </a:t>
-            </a:r>
-            <a:r>
-              <a:rPr lang="en-US" b="1" dirty="0">
-                <a:solidFill>
-                  <a:srgbClr val="7030A0"/>
-                </a:solidFill>
-                <a:latin typeface="Consolas" panose="020B0609020204030204" pitchFamily="49" charset="0"/>
-              </a:rPr>
-              <a:t>B</a:t>
-            </a:r>
+            <a:endParaRPr lang="en-US" b="1" dirty="0">
+              <a:solidFill>
+                <a:srgbClr val="7030A0"/>
+              </a:solidFill>
+              <a:latin typeface="Consolas" panose="020B0609020204030204" pitchFamily="49" charset="0"/>
+            </a:endParaRPr>
           </a:p>
         </p:txBody>
       </p:sp>

</xml_diff>

<commit_message>
One more round or review by Mungo and Alisdair
</commit_message>
<xml_diff>
--- a/relocate/Trivial Relocation - St. Louis 06-2024.pptx
+++ b/relocate/Trivial Relocation - St. Louis 06-2024.pptx
@@ -6731,7 +6731,7 @@
           <a:p>
             <a:r>
               <a:rPr lang="en-US" dirty="0"/>
-              <a:t>St. Louis, June, 2024</a:t>
+              <a:t>St. Louis, June 28, 2024</a:t>
             </a:r>
             <a:endParaRPr lang="en-US" dirty="0">
               <a:hlinkClick r:id="rId2"/>
@@ -11419,13 +11419,13 @@
           <a:p>
             <a:r>
               <a:rPr lang="en-US" dirty="0"/>
-              <a:t>Efficient vector growth</a:t>
+              <a:t>Relocating vector elements during vector growth by byte copy is more efficient than move-constructing then destroying individual objects.</a:t>
             </a:r>
           </a:p>
           <a:p>
             <a:r>
               <a:rPr lang="en-US" dirty="0"/>
-              <a:t>Types such as some implementations of </a:t>
+              <a:t>Types having  throwing move constructors, such as some implementations of </a:t>
             </a:r>
             <a:r>
               <a:rPr lang="en-US" dirty="0">
@@ -11436,13 +11436,13 @@
             </a:r>
             <a:r>
               <a:rPr lang="en-US" dirty="0"/>
-              <a:t>, having  throwing move constructors.</a:t>
+              <a:t>, can often be trivially relocated, which is a non-allocating and non-throwing operation.</a:t>
             </a:r>
           </a:p>
           <a:p>
             <a:r>
               <a:rPr lang="en-US" dirty="0"/>
-              <a:t>Move construction of types like </a:t>
+              <a:t>When a type like </a:t>
             </a:r>
             <a:r>
               <a:rPr lang="en-US" dirty="0" err="1">
@@ -11453,7 +11453,7 @@
             </a:r>
             <a:r>
               <a:rPr lang="en-US" dirty="0"/>
-              <a:t>, where the moved-from container is empty, with elements left in a destructed state.</a:t>
+              <a:t>, is moved, its elements can often be trivially relocated (leaving the moved-from container empty) rather than moved element-by-element (leaving the moved-from container full of moved-from objects).</a:t>
             </a:r>
           </a:p>
           <a:p>
@@ -13381,7 +13381,7 @@
         <p:spPr>
           <a:xfrm>
             <a:off x="1484310" y="3217333"/>
-            <a:ext cx="9760864" cy="2221656"/>
+            <a:ext cx="9760864" cy="2396068"/>
           </a:xfrm>
           <a:prstGeom prst="rect">
             <a:avLst/>
@@ -13420,7 +13420,7 @@
                 </a:solidFill>
                 <a:latin typeface="Consolas" panose="020B0609020204030204" pitchFamily="49" charset="0"/>
               </a:rPr>
-              <a:t>Trivially relocatable if node cannot point to itself</a:t>
+              <a:t>Not trivially relocatable if node might point to itself</a:t>
             </a:r>
           </a:p>
           <a:p>
@@ -13466,8 +13466,22 @@
               <a:rPr lang="en-US" dirty="0">
                 <a:latin typeface="Consolas" panose="020B0609020204030204" pitchFamily="49" charset="0"/>
               </a:rPr>
-              <a:t>(</a:t>
-            </a:r>
+              <a:t>(std::</a:t>
+            </a:r>
+            <a:r>
+              <a:rPr lang="en-US" dirty="0" err="1">
+                <a:latin typeface="Consolas" panose="020B0609020204030204" pitchFamily="49" charset="0"/>
+              </a:rPr>
+              <a:t>is_trivially_relocatable_v</a:t>
+            </a:r>
+            <a:r>
+              <a:rPr lang="en-US" dirty="0">
+                <a:latin typeface="Consolas" panose="020B0609020204030204" pitchFamily="49" charset="0"/>
+              </a:rPr>
+              <a:t>&lt;T&gt; &amp;&amp;</a:t>
+            </a:r>
+          </a:p>
+          <a:p>
             <a:r>
               <a:rPr lang="en-US" dirty="0">
                 <a:solidFill>
@@ -13475,7 +13489,7 @@
                 </a:solidFill>
                 <a:latin typeface="Consolas" panose="020B0609020204030204" pitchFamily="49" charset="0"/>
               </a:rPr>
-              <a:t>! </a:t>
+              <a:t>                                  ! </a:t>
             </a:r>
             <a:r>
               <a:rPr lang="en-US" dirty="0" err="1">
@@ -13902,7 +13916,12 @@
             <p:ph idx="1"/>
           </p:nvPr>
         </p:nvSpPr>
-        <p:spPr/>
+        <p:spPr>
+          <a:xfrm>
+            <a:off x="1484310" y="1887166"/>
+            <a:ext cx="10018713" cy="4183433"/>
+          </a:xfrm>
+        </p:spPr>
         <p:txBody>
           <a:bodyPr>
             <a:normAutofit/>
@@ -13955,7 +13974,18 @@
           <a:p>
             <a:r>
               <a:rPr lang="en-US" dirty="0"/>
-              <a:t>Requires compiler "magic" to manage object lifetimes without constructors and destructors.</a:t>
+              <a:t>Requires compiler "magic" to manage object lifetimes without constructors and destructors.  Like </a:t>
+            </a:r>
+            <a:r>
+              <a:rPr lang="en-US" dirty="0">
+                <a:latin typeface="Courier New" panose="02070309020205020404" pitchFamily="49" charset="0"/>
+                <a:cs typeface="Courier New" panose="02070309020205020404" pitchFamily="49" charset="0"/>
+              </a:rPr>
+              <a:t>std::launder</a:t>
+            </a:r>
+            <a:r>
+              <a:rPr lang="en-US" dirty="0"/>
+              <a:t>, the "magic" adds no runtime cost.</a:t>
             </a:r>
           </a:p>
         </p:txBody>
@@ -25121,7 +25151,15 @@
           <a:p>
             <a:r>
               <a:rPr lang="en-US" dirty="0"/>
-              <a:t>Swap design (P3239) did not make the pre-meeting mailing deadline; we are happy to bring a complete design and wording to a future telecom.</a:t>
+              <a:t>Swap design (P3239) still has a </a:t>
+            </a:r>
+            <a:r>
+              <a:rPr lang="en-US"/>
+              <a:t>few rough edges; </a:t>
+            </a:r>
+            <a:r>
+              <a:rPr lang="en-US" dirty="0"/>
+              <a:t>we are happy to bring a complete design and wording to a future telecom.</a:t>
             </a:r>
           </a:p>
         </p:txBody>
@@ -28054,7 +28092,7 @@
           <a:p>
             <a:r>
               <a:rPr lang="en-US" dirty="0"/>
-              <a:t>Goals pf P2786 et al.:</a:t>
+              <a:t>Goals of P2786 et al.:</a:t>
             </a:r>
           </a:p>
           <a:p>
@@ -30950,6 +30988,19 @@
                 <a:cs typeface="Courier New" panose="02070309020205020404" pitchFamily="49" charset="0"/>
               </a:rPr>
               <a:t>… but using </a:t>
+            </a:r>
+            <a:r>
+              <a:rPr lang="en-US" dirty="0" err="1">
+                <a:latin typeface="Courier New" panose="02070309020205020404" pitchFamily="49" charset="0"/>
+                <a:cs typeface="Courier New" panose="02070309020205020404" pitchFamily="49" charset="0"/>
+              </a:rPr>
+              <a:t>memcpy</a:t>
+            </a:r>
+            <a:r>
+              <a:rPr lang="en-US" dirty="0">
+                <a:cs typeface="Courier New" panose="02070309020205020404" pitchFamily="49" charset="0"/>
+              </a:rPr>
+              <a:t> or </a:t>
             </a:r>
             <a:r>
               <a:rPr lang="en-US" dirty="0" err="1">

</xml_diff>

<commit_message>
Minor change to Trivial Relocation PPT
</commit_message>
<xml_diff>
--- a/relocate/Trivial Relocation - St. Louis 06-2024.pptx
+++ b/relocate/Trivial Relocation - St. Louis 06-2024.pptx
@@ -25151,15 +25151,7 @@
           <a:p>
             <a:r>
               <a:rPr lang="en-US" dirty="0"/>
-              <a:t>Swap design (P3239) still has a </a:t>
-            </a:r>
-            <a:r>
-              <a:rPr lang="en-US"/>
-              <a:t>few rough edges; </a:t>
-            </a:r>
-            <a:r>
-              <a:rPr lang="en-US" dirty="0"/>
-              <a:t>we are happy to bring a complete design and wording to a future telecom.</a:t>
+              <a:t>Swap design (P3239) still has a few rough edges; we are happy to bring a complete design and wording to a future telecom.</a:t>
             </a:r>
           </a:p>
         </p:txBody>

</xml_diff>